<commit_message>
PPTX writer: keep tables and surrounding text on same slide
Previously, when a slide contained bullet points before and after a
table, content would be split across multiple slides or use a two-column
layout that didn't preserve the source order.

This change:

1. Modified splitBlocks' in Presentation.hs to continue accumulating
   content after tables instead of immediately splitting to a new slide.

2. When a slide has a table with surrounding text, use ContentSlide
   (single column) instead of ContentWithCaptionSlide (two columns)
   to preserve content order.

3. Added vertical stacking in Output.hs (shapesToElementsStacked) to
   properly position multiple shapes (tables + text) within a content
   area. Space is allocated proportionally based on content size
   (paragraphs and table rows).

Co-Authored-By: Claude Opus 4.5 <noreply@anthropic.com>
</commit_message>
<xml_diff>
--- a/test/pptx/comparison/non-text-first/output.pptx
+++ b/test/pptx/comparison/non-text-first/output.pptx
@@ -3175,6 +3175,31 @@
           </a:graphicData>
         </a:graphic>
       </p:graphicFrame>
+      <p:sp>
+        <p:nvSpPr>
+          <p:cNvPr id="3" name="Content Placeholder 2"/>
+          <p:cNvSpPr>
+            <a:spLocks noGrp="1"/>
+          </p:cNvSpPr>
+          <p:nvPr>
+            <p:ph idx="1" sz="half"/>
+          </p:nvPr>
+        </p:nvSpPr>
+        <p:spPr/>
+        <p:txBody>
+          <a:bodyPr/>
+          <a:lstStyle/>
+          <a:p>
+            <a:pPr lvl="0" indent="0" marL="0">
+              <a:buNone/>
+            </a:pPr>
+            <a:r>
+              <a:rPr/>
+              <a:t>Plus a paragraph here</a:t>
+            </a:r>
+          </a:p>
+        </p:txBody>
+      </p:sp>
       <p:pic>
         <p:nvPicPr>
           <p:cNvPr descr="fig:  lalune.jpg" id="0" name="Picture 1"/>

</xml_diff>